<commit_message>
update of backend doc
</commit_message>
<xml_diff>
--- a/backend-infrastructure-requirements.pptx
+++ b/backend-infrastructure-requirements.pptx
@@ -243,7 +243,7 @@
           <a:p>
             <a:fld id="{882805C7-747B-4752-9F69-9BC597374324}" type="datetimeFigureOut">
               <a:rPr lang="en-US" smtClean="0"/>
-              <a:t>2021-07-19</a:t>
+              <a:t>2021-07-24</a:t>
             </a:fld>
             <a:endParaRPr lang="en-US"/>
           </a:p>
@@ -413,7 +413,7 @@
           <a:p>
             <a:fld id="{882805C7-747B-4752-9F69-9BC597374324}" type="datetimeFigureOut">
               <a:rPr lang="en-US" smtClean="0"/>
-              <a:t>2021-07-19</a:t>
+              <a:t>2021-07-24</a:t>
             </a:fld>
             <a:endParaRPr lang="en-US"/>
           </a:p>
@@ -593,7 +593,7 @@
           <a:p>
             <a:fld id="{882805C7-747B-4752-9F69-9BC597374324}" type="datetimeFigureOut">
               <a:rPr lang="en-US" smtClean="0"/>
-              <a:t>2021-07-19</a:t>
+              <a:t>2021-07-24</a:t>
             </a:fld>
             <a:endParaRPr lang="en-US"/>
           </a:p>
@@ -763,7 +763,7 @@
           <a:p>
             <a:fld id="{882805C7-747B-4752-9F69-9BC597374324}" type="datetimeFigureOut">
               <a:rPr lang="en-US" smtClean="0"/>
-              <a:t>2021-07-19</a:t>
+              <a:t>2021-07-24</a:t>
             </a:fld>
             <a:endParaRPr lang="en-US"/>
           </a:p>
@@ -1007,7 +1007,7 @@
           <a:p>
             <a:fld id="{882805C7-747B-4752-9F69-9BC597374324}" type="datetimeFigureOut">
               <a:rPr lang="en-US" smtClean="0"/>
-              <a:t>2021-07-19</a:t>
+              <a:t>2021-07-24</a:t>
             </a:fld>
             <a:endParaRPr lang="en-US"/>
           </a:p>
@@ -1239,7 +1239,7 @@
           <a:p>
             <a:fld id="{882805C7-747B-4752-9F69-9BC597374324}" type="datetimeFigureOut">
               <a:rPr lang="en-US" smtClean="0"/>
-              <a:t>2021-07-19</a:t>
+              <a:t>2021-07-24</a:t>
             </a:fld>
             <a:endParaRPr lang="en-US"/>
           </a:p>
@@ -1606,7 +1606,7 @@
           <a:p>
             <a:fld id="{882805C7-747B-4752-9F69-9BC597374324}" type="datetimeFigureOut">
               <a:rPr lang="en-US" smtClean="0"/>
-              <a:t>2021-07-19</a:t>
+              <a:t>2021-07-24</a:t>
             </a:fld>
             <a:endParaRPr lang="en-US"/>
           </a:p>
@@ -1724,7 +1724,7 @@
           <a:p>
             <a:fld id="{882805C7-747B-4752-9F69-9BC597374324}" type="datetimeFigureOut">
               <a:rPr lang="en-US" smtClean="0"/>
-              <a:t>2021-07-19</a:t>
+              <a:t>2021-07-24</a:t>
             </a:fld>
             <a:endParaRPr lang="en-US"/>
           </a:p>
@@ -1819,7 +1819,7 @@
           <a:p>
             <a:fld id="{882805C7-747B-4752-9F69-9BC597374324}" type="datetimeFigureOut">
               <a:rPr lang="en-US" smtClean="0"/>
-              <a:t>2021-07-19</a:t>
+              <a:t>2021-07-24</a:t>
             </a:fld>
             <a:endParaRPr lang="en-US"/>
           </a:p>
@@ -2096,7 +2096,7 @@
           <a:p>
             <a:fld id="{882805C7-747B-4752-9F69-9BC597374324}" type="datetimeFigureOut">
               <a:rPr lang="en-US" smtClean="0"/>
-              <a:t>2021-07-19</a:t>
+              <a:t>2021-07-24</a:t>
             </a:fld>
             <a:endParaRPr lang="en-US"/>
           </a:p>
@@ -2353,7 +2353,7 @@
           <a:p>
             <a:fld id="{882805C7-747B-4752-9F69-9BC597374324}" type="datetimeFigureOut">
               <a:rPr lang="en-US" smtClean="0"/>
-              <a:t>2021-07-19</a:t>
+              <a:t>2021-07-24</a:t>
             </a:fld>
             <a:endParaRPr lang="en-US"/>
           </a:p>
@@ -2566,7 +2566,7 @@
           <a:p>
             <a:fld id="{882805C7-747B-4752-9F69-9BC597374324}" type="datetimeFigureOut">
               <a:rPr lang="en-US" smtClean="0"/>
-              <a:t>2021-07-19</a:t>
+              <a:t>2021-07-24</a:t>
             </a:fld>
             <a:endParaRPr lang="en-US"/>
           </a:p>
@@ -2987,7 +2987,7 @@
         </p:nvCxnSpPr>
         <p:spPr>
           <a:xfrm>
-            <a:off x="3587745" y="2798653"/>
+            <a:off x="3587745" y="2576245"/>
             <a:ext cx="2124000" cy="0"/>
           </a:xfrm>
           <a:prstGeom prst="straightConnector1">
@@ -3028,7 +3028,7 @@
         </p:nvCxnSpPr>
         <p:spPr>
           <a:xfrm>
-            <a:off x="3587745" y="4366130"/>
+            <a:off x="3587745" y="4291994"/>
             <a:ext cx="2124000" cy="0"/>
           </a:xfrm>
           <a:prstGeom prst="straightConnector1">
@@ -3108,7 +3108,7 @@
         </p:nvSpPr>
         <p:spPr>
           <a:xfrm>
-            <a:off x="6304650" y="1397897"/>
+            <a:off x="6304650" y="1175489"/>
             <a:ext cx="1597104" cy="300082"/>
           </a:xfrm>
           <a:prstGeom prst="rect">
@@ -3145,8 +3145,8 @@
         </p:nvSpPr>
         <p:spPr>
           <a:xfrm>
-            <a:off x="1603890" y="3004186"/>
-            <a:ext cx="998607" cy="507831"/>
+            <a:off x="1138668" y="2781778"/>
+            <a:ext cx="1929054" cy="507831"/>
           </a:xfrm>
           <a:prstGeom prst="rect">
             <a:avLst/>
@@ -3161,15 +3161,15 @@
           <a:p>
             <a:pPr algn="ctr"/>
             <a:r>
-              <a:rPr lang="sv-SE" sz="1350" dirty="0"/>
-              <a:t>Types card</a:t>
+              <a:rPr lang="sv-SE" sz="1350" i="1" dirty="0"/>
+              <a:t>Types card data</a:t>
             </a:r>
             <a:br>
               <a:rPr lang="sv-SE" sz="1350" dirty="0"/>
             </a:br>
             <a:r>
               <a:rPr lang="sv-SE" sz="1350" dirty="0"/>
-              <a:t>data details</a:t>
+              <a:t>(card not present - CNP)</a:t>
             </a:r>
             <a:endParaRPr lang="en-US" sz="1350" dirty="0"/>
           </a:p>
@@ -3189,7 +3189,7 @@
         </p:nvSpPr>
         <p:spPr>
           <a:xfrm>
-            <a:off x="275593" y="2701643"/>
+            <a:off x="275593" y="2368029"/>
             <a:ext cx="1008609" cy="300082"/>
           </a:xfrm>
           <a:prstGeom prst="rect">
@@ -3225,7 +3225,7 @@
         </p:nvSpPr>
         <p:spPr>
           <a:xfrm>
-            <a:off x="275593" y="3012281"/>
+            <a:off x="275593" y="2067013"/>
             <a:ext cx="1124154" cy="300082"/>
           </a:xfrm>
           <a:prstGeom prst="rect">
@@ -3268,7 +3268,7 @@
         </p:nvSpPr>
         <p:spPr>
           <a:xfrm>
-            <a:off x="275593" y="3857093"/>
+            <a:off x="275593" y="3782957"/>
             <a:ext cx="1376082" cy="300082"/>
           </a:xfrm>
           <a:prstGeom prst="rect">
@@ -3316,7 +3316,7 @@
         </p:nvSpPr>
         <p:spPr>
           <a:xfrm>
-            <a:off x="275594" y="4156671"/>
+            <a:off x="275594" y="4082535"/>
             <a:ext cx="857671" cy="300082"/>
           </a:xfrm>
           <a:prstGeom prst="rect">
@@ -3451,7 +3451,7 @@
         </p:blipFill>
         <p:spPr>
           <a:xfrm>
-            <a:off x="8047579" y="4133588"/>
+            <a:off x="8047579" y="4059452"/>
             <a:ext cx="643500" cy="421200"/>
           </a:xfrm>
           <a:prstGeom prst="rect">
@@ -3490,7 +3490,7 @@
         </p:blipFill>
         <p:spPr>
           <a:xfrm>
-            <a:off x="8047579" y="2576510"/>
+            <a:off x="8047579" y="2354102"/>
             <a:ext cx="643500" cy="421200"/>
           </a:xfrm>
           <a:prstGeom prst="rect">
@@ -3512,7 +3512,7 @@
         </p:nvSpPr>
         <p:spPr>
           <a:xfrm>
-            <a:off x="4248696" y="1714468"/>
+            <a:off x="4248696" y="1492060"/>
             <a:ext cx="636024" cy="320777"/>
           </a:xfrm>
           <a:prstGeom prst="ellipse">
@@ -3601,7 +3601,7 @@
         </p:nvSpPr>
         <p:spPr>
           <a:xfrm>
-            <a:off x="6788835" y="1714468"/>
+            <a:off x="6788835" y="1492060"/>
             <a:ext cx="636024" cy="320777"/>
           </a:xfrm>
           <a:prstGeom prst="ellipse">
@@ -3690,7 +3690,7 @@
         </p:nvSpPr>
         <p:spPr>
           <a:xfrm>
-            <a:off x="3968440" y="1392569"/>
+            <a:off x="3968440" y="1170161"/>
             <a:ext cx="1200586" cy="300082"/>
           </a:xfrm>
           <a:prstGeom prst="rect">
@@ -3744,7 +3744,7 @@
         </p:blipFill>
         <p:spPr>
           <a:xfrm>
-            <a:off x="1882953" y="2584175"/>
+            <a:off x="1882953" y="2361767"/>
             <a:ext cx="421200" cy="421200"/>
           </a:xfrm>
           <a:prstGeom prst="rect">
@@ -3768,7 +3768,7 @@
         </p:nvCxnSpPr>
         <p:spPr>
           <a:xfrm flipV="1">
-            <a:off x="3568065" y="2001092"/>
+            <a:off x="3568065" y="1778684"/>
             <a:ext cx="708379" cy="570810"/>
           </a:xfrm>
           <a:prstGeom prst="straightConnector1">
@@ -3810,7 +3810,7 @@
         </p:nvCxnSpPr>
         <p:spPr>
           <a:xfrm flipV="1">
-            <a:off x="3600000" y="1931426"/>
+            <a:off x="3600000" y="1709018"/>
             <a:ext cx="3145605" cy="738982"/>
           </a:xfrm>
           <a:prstGeom prst="straightConnector1">
@@ -3850,7 +3850,7 @@
         </p:nvSpPr>
         <p:spPr>
           <a:xfrm>
-            <a:off x="6448319" y="2898398"/>
+            <a:off x="6448319" y="2675990"/>
             <a:ext cx="1797461" cy="300082"/>
           </a:xfrm>
           <a:prstGeom prst="rect">
@@ -3886,7 +3886,7 @@
         </p:nvSpPr>
         <p:spPr>
           <a:xfrm>
-            <a:off x="6448319" y="4462852"/>
+            <a:off x="6448319" y="4388716"/>
             <a:ext cx="1797461" cy="300082"/>
           </a:xfrm>
           <a:prstGeom prst="rect">
@@ -3922,7 +3922,7 @@
         </p:nvSpPr>
         <p:spPr>
           <a:xfrm>
-            <a:off x="2345704" y="878368"/>
+            <a:off x="2345704" y="736274"/>
             <a:ext cx="1797461" cy="369332"/>
           </a:xfrm>
           <a:prstGeom prst="rect">
@@ -3959,7 +3959,7 @@
         </p:nvSpPr>
         <p:spPr>
           <a:xfrm>
-            <a:off x="5516226" y="878368"/>
+            <a:off x="5516226" y="736274"/>
             <a:ext cx="1094807" cy="369332"/>
           </a:xfrm>
           <a:prstGeom prst="rect">
@@ -3996,7 +3996,7 @@
         </p:nvSpPr>
         <p:spPr>
           <a:xfrm>
-            <a:off x="7802267" y="878368"/>
+            <a:off x="7802267" y="736274"/>
             <a:ext cx="1135196" cy="369332"/>
           </a:xfrm>
           <a:prstGeom prst="rect">
@@ -4033,7 +4033,7 @@
         </p:nvSpPr>
         <p:spPr>
           <a:xfrm>
-            <a:off x="2089697" y="232802"/>
+            <a:off x="2089697" y="201912"/>
             <a:ext cx="4958094" cy="415498"/>
           </a:xfrm>
           <a:prstGeom prst="rect">
@@ -4070,7 +4070,7 @@
         </p:nvSpPr>
         <p:spPr>
           <a:xfrm>
-            <a:off x="4257987" y="2685689"/>
+            <a:off x="4257987" y="2463281"/>
             <a:ext cx="1019831" cy="216110"/>
           </a:xfrm>
           <a:prstGeom prst="rect">
@@ -4115,7 +4115,7 @@
         </p:nvSpPr>
         <p:spPr>
           <a:xfrm>
-            <a:off x="4257987" y="4253181"/>
+            <a:off x="4257987" y="4179045"/>
             <a:ext cx="1019831" cy="216110"/>
           </a:xfrm>
           <a:prstGeom prst="rect">
@@ -4207,7 +4207,7 @@
         </p:nvGrpSpPr>
         <p:grpSpPr>
           <a:xfrm>
-            <a:off x="3009745" y="2571902"/>
+            <a:off x="3009745" y="2349494"/>
             <a:ext cx="523971" cy="421200"/>
             <a:chOff x="1619672" y="3068960"/>
             <a:chExt cx="557162" cy="447881"/>
@@ -5435,7 +5435,7 @@
         </p:nvGrpSpPr>
         <p:grpSpPr>
           <a:xfrm>
-            <a:off x="3009745" y="4136460"/>
+            <a:off x="3009745" y="4062324"/>
             <a:ext cx="523971" cy="421200"/>
             <a:chOff x="1619672" y="3068960"/>
             <a:chExt cx="557162" cy="447881"/>
@@ -7904,7 +7904,7 @@
         </p:blipFill>
         <p:spPr>
           <a:xfrm>
-            <a:off x="5798693" y="2590357"/>
+            <a:off x="5798693" y="2367949"/>
             <a:ext cx="421234" cy="421200"/>
           </a:xfrm>
           <a:prstGeom prst="rect">
@@ -7986,7 +7986,7 @@
         </p:blipFill>
         <p:spPr>
           <a:xfrm>
-            <a:off x="5798693" y="4149808"/>
+            <a:off x="5798693" y="4075672"/>
             <a:ext cx="421234" cy="421200"/>
           </a:xfrm>
           <a:prstGeom prst="rect">
@@ -8047,7 +8047,7 @@
         </p:nvSpPr>
         <p:spPr>
           <a:xfrm>
-            <a:off x="6078113" y="4482225"/>
+            <a:off x="6078113" y="4408089"/>
             <a:ext cx="382846" cy="252000"/>
           </a:xfrm>
           <a:prstGeom prst="can">
@@ -8126,7 +8126,7 @@
         </p:nvSpPr>
         <p:spPr>
           <a:xfrm>
-            <a:off x="6078113" y="2925147"/>
+            <a:off x="6078113" y="2702739"/>
             <a:ext cx="382846" cy="252000"/>
           </a:xfrm>
           <a:prstGeom prst="can">
@@ -8240,7 +8240,7 @@
         </p:nvSpPr>
         <p:spPr>
           <a:xfrm>
-            <a:off x="1160095" y="876304"/>
+            <a:off x="1160095" y="734210"/>
             <a:ext cx="1797461" cy="369332"/>
           </a:xfrm>
           <a:prstGeom prst="rect">
@@ -8279,7 +8279,7 @@
         </p:nvCxnSpPr>
         <p:spPr>
           <a:xfrm>
-            <a:off x="2358000" y="2798493"/>
+            <a:off x="2358000" y="2576085"/>
             <a:ext cx="612000" cy="0"/>
           </a:xfrm>
           <a:prstGeom prst="straightConnector1">
@@ -8318,7 +8318,7 @@
         </p:nvSpPr>
         <p:spPr>
           <a:xfrm>
-            <a:off x="1446316" y="4575244"/>
+            <a:off x="1446316" y="4501108"/>
             <a:ext cx="1313757" cy="715581"/>
           </a:xfrm>
           <a:prstGeom prst="rect">
@@ -8334,7 +8334,7 @@
           <a:p>
             <a:pPr algn="ctr"/>
             <a:r>
-              <a:rPr lang="sv-SE" sz="1350" dirty="0"/>
+              <a:rPr lang="sv-SE" sz="1350" i="1" dirty="0"/>
               <a:t>Selects card</a:t>
             </a:r>
             <a:br>
@@ -8386,7 +8386,7 @@
         </p:blipFill>
         <p:spPr>
           <a:xfrm>
-            <a:off x="1882953" y="4151423"/>
+            <a:off x="1882953" y="4077287"/>
             <a:ext cx="421200" cy="421200"/>
           </a:xfrm>
           <a:prstGeom prst="rect">
@@ -8424,7 +8424,7 @@
           <a:p>
             <a:pPr algn="ctr"/>
             <a:r>
-              <a:rPr lang="sv-SE" sz="1350" dirty="0"/>
+              <a:rPr lang="sv-SE" sz="1350" i="1" dirty="0"/>
               <a:t>Selects card</a:t>
             </a:r>
             <a:br>
@@ -8535,7 +8535,7 @@
         </p:nvCxnSpPr>
         <p:spPr>
           <a:xfrm>
-            <a:off x="2358000" y="4363133"/>
+            <a:off x="2358000" y="4288997"/>
             <a:ext cx="612000" cy="0"/>
           </a:xfrm>
           <a:prstGeom prst="straightConnector1">
@@ -8575,7 +8575,7 @@
         </p:nvSpPr>
         <p:spPr>
           <a:xfrm>
-            <a:off x="6671127" y="4101601"/>
+            <a:off x="6671127" y="4027465"/>
             <a:ext cx="941283" cy="253916"/>
           </a:xfrm>
           <a:prstGeom prst="rect">
@@ -8647,7 +8647,7 @@
         </p:nvSpPr>
         <p:spPr>
           <a:xfrm>
-            <a:off x="6671127" y="2538221"/>
+            <a:off x="6671127" y="2315813"/>
             <a:ext cx="941283" cy="253916"/>
           </a:xfrm>
           <a:prstGeom prst="rect">
@@ -8685,7 +8685,7 @@
         </p:nvCxnSpPr>
         <p:spPr>
           <a:xfrm>
-            <a:off x="6306125" y="2800130"/>
+            <a:off x="6306125" y="2577722"/>
             <a:ext cx="1764000" cy="0"/>
           </a:xfrm>
           <a:prstGeom prst="straightConnector1">
@@ -8726,7 +8726,7 @@
         </p:nvCxnSpPr>
         <p:spPr>
           <a:xfrm>
-            <a:off x="6306125" y="4366130"/>
+            <a:off x="6306125" y="4291994"/>
             <a:ext cx="1764000" cy="0"/>
           </a:xfrm>
           <a:prstGeom prst="straightConnector1">
@@ -8806,7 +8806,7 @@
         </p:nvSpPr>
         <p:spPr>
           <a:xfrm rot="19917555">
-            <a:off x="3723268" y="2313012"/>
+            <a:off x="3723268" y="2090604"/>
             <a:ext cx="166882" cy="386973"/>
           </a:xfrm>
           <a:prstGeom prst="ellipse">
@@ -8859,7 +8859,7 @@
         </p:nvSpPr>
         <p:spPr>
           <a:xfrm>
-            <a:off x="2374388" y="2075878"/>
+            <a:off x="2374388" y="1853470"/>
             <a:ext cx="1797461" cy="507831"/>
           </a:xfrm>
           <a:prstGeom prst="rect">
@@ -8903,7 +8903,7 @@
         </p:nvSpPr>
         <p:spPr>
           <a:xfrm>
-            <a:off x="4437856" y="3746223"/>
+            <a:off x="4437856" y="3672087"/>
             <a:ext cx="636024" cy="320777"/>
           </a:xfrm>
           <a:prstGeom prst="ellipse">
@@ -8992,7 +8992,7 @@
         </p:nvSpPr>
         <p:spPr>
           <a:xfrm>
-            <a:off x="3630528" y="3442704"/>
+            <a:off x="3630528" y="3368568"/>
             <a:ext cx="2245551" cy="300082"/>
           </a:xfrm>
           <a:prstGeom prst="rect">
@@ -9035,13 +9035,14 @@
         </p:nvCxnSpPr>
         <p:spPr>
           <a:xfrm flipV="1">
-            <a:off x="3582000" y="3960000"/>
+            <a:off x="3582000" y="3885864"/>
             <a:ext cx="810000" cy="288000"/>
           </a:xfrm>
           <a:prstGeom prst="straightConnector1">
             <a:avLst/>
           </a:prstGeom>
           <a:ln w="12700">
+            <a:prstDash val="sysDash"/>
             <a:headEnd type="triangle"/>
             <a:tailEnd type="triangle"/>
           </a:ln>
@@ -9077,13 +9078,14 @@
         </p:nvCxnSpPr>
         <p:spPr>
           <a:xfrm>
-            <a:off x="5076000" y="3996000"/>
+            <a:off x="5076000" y="3921864"/>
             <a:ext cx="630000" cy="252000"/>
           </a:xfrm>
           <a:prstGeom prst="straightConnector1">
             <a:avLst/>
           </a:prstGeom>
           <a:ln w="12700">
+            <a:prstDash val="sysDash"/>
             <a:headEnd type="triangle"/>
             <a:tailEnd type="triangle"/>
           </a:ln>
@@ -9117,7 +9119,7 @@
         </p:nvSpPr>
         <p:spPr>
           <a:xfrm>
-            <a:off x="2179068" y="3649304"/>
+            <a:off x="2179068" y="3575168"/>
             <a:ext cx="2188101" cy="507831"/>
           </a:xfrm>
           <a:prstGeom prst="rect">

</xml_diff>